<commit_message>
removed more package dependencies from counter_widget.py and removed the package imports
</commit_message>
<xml_diff>
--- a/counter/fa-5 counter issue.pptx
+++ b/counter/fa-5 counter issue.pptx
@@ -11,6 +11,7 @@
     <p:sldId id="259" r:id="rId5"/>
     <p:sldId id="260" r:id="rId6"/>
     <p:sldId id="261" r:id="rId7"/>
+    <p:sldId id="262" r:id="rId8"/>
   </p:sldIdLst>
   <p:sldSz cx="12192000" cy="6858000"/>
   <p:notesSz cx="6858000" cy="9144000"/>
@@ -264,7 +265,7 @@
           <a:p>
             <a:fld id="{F03CD8E2-3BC8-4475-804C-0D0A5DAAC627}" type="datetimeFigureOut">
               <a:rPr lang="en-US" smtClean="0"/>
-              <a:t>3/14/2022</a:t>
+              <a:t>3/16/2022</a:t>
             </a:fld>
             <a:endParaRPr lang="en-US"/>
           </a:p>
@@ -462,7 +463,7 @@
           <a:p>
             <a:fld id="{F03CD8E2-3BC8-4475-804C-0D0A5DAAC627}" type="datetimeFigureOut">
               <a:rPr lang="en-US" smtClean="0"/>
-              <a:t>3/14/2022</a:t>
+              <a:t>3/16/2022</a:t>
             </a:fld>
             <a:endParaRPr lang="en-US"/>
           </a:p>
@@ -670,7 +671,7 @@
           <a:p>
             <a:fld id="{F03CD8E2-3BC8-4475-804C-0D0A5DAAC627}" type="datetimeFigureOut">
               <a:rPr lang="en-US" smtClean="0"/>
-              <a:t>3/14/2022</a:t>
+              <a:t>3/16/2022</a:t>
             </a:fld>
             <a:endParaRPr lang="en-US"/>
           </a:p>
@@ -868,7 +869,7 @@
           <a:p>
             <a:fld id="{F03CD8E2-3BC8-4475-804C-0D0A5DAAC627}" type="datetimeFigureOut">
               <a:rPr lang="en-US" smtClean="0"/>
-              <a:t>3/14/2022</a:t>
+              <a:t>3/16/2022</a:t>
             </a:fld>
             <a:endParaRPr lang="en-US"/>
           </a:p>
@@ -1143,7 +1144,7 @@
           <a:p>
             <a:fld id="{F03CD8E2-3BC8-4475-804C-0D0A5DAAC627}" type="datetimeFigureOut">
               <a:rPr lang="en-US" smtClean="0"/>
-              <a:t>3/14/2022</a:t>
+              <a:t>3/16/2022</a:t>
             </a:fld>
             <a:endParaRPr lang="en-US"/>
           </a:p>
@@ -1408,7 +1409,7 @@
           <a:p>
             <a:fld id="{F03CD8E2-3BC8-4475-804C-0D0A5DAAC627}" type="datetimeFigureOut">
               <a:rPr lang="en-US" smtClean="0"/>
-              <a:t>3/14/2022</a:t>
+              <a:t>3/16/2022</a:t>
             </a:fld>
             <a:endParaRPr lang="en-US"/>
           </a:p>
@@ -1820,7 +1821,7 @@
           <a:p>
             <a:fld id="{F03CD8E2-3BC8-4475-804C-0D0A5DAAC627}" type="datetimeFigureOut">
               <a:rPr lang="en-US" smtClean="0"/>
-              <a:t>3/14/2022</a:t>
+              <a:t>3/16/2022</a:t>
             </a:fld>
             <a:endParaRPr lang="en-US"/>
           </a:p>
@@ -1961,7 +1962,7 @@
           <a:p>
             <a:fld id="{F03CD8E2-3BC8-4475-804C-0D0A5DAAC627}" type="datetimeFigureOut">
               <a:rPr lang="en-US" smtClean="0"/>
-              <a:t>3/14/2022</a:t>
+              <a:t>3/16/2022</a:t>
             </a:fld>
             <a:endParaRPr lang="en-US"/>
           </a:p>
@@ -2074,7 +2075,7 @@
           <a:p>
             <a:fld id="{F03CD8E2-3BC8-4475-804C-0D0A5DAAC627}" type="datetimeFigureOut">
               <a:rPr lang="en-US" smtClean="0"/>
-              <a:t>3/14/2022</a:t>
+              <a:t>3/16/2022</a:t>
             </a:fld>
             <a:endParaRPr lang="en-US"/>
           </a:p>
@@ -2385,7 +2386,7 @@
           <a:p>
             <a:fld id="{F03CD8E2-3BC8-4475-804C-0D0A5DAAC627}" type="datetimeFigureOut">
               <a:rPr lang="en-US" smtClean="0"/>
-              <a:t>3/14/2022</a:t>
+              <a:t>3/16/2022</a:t>
             </a:fld>
             <a:endParaRPr lang="en-US"/>
           </a:p>
@@ -2673,7 +2674,7 @@
           <a:p>
             <a:fld id="{F03CD8E2-3BC8-4475-804C-0D0A5DAAC627}" type="datetimeFigureOut">
               <a:rPr lang="en-US" smtClean="0"/>
-              <a:t>3/14/2022</a:t>
+              <a:t>3/16/2022</a:t>
             </a:fld>
             <a:endParaRPr lang="en-US"/>
           </a:p>
@@ -2914,7 +2915,7 @@
           <a:p>
             <a:fld id="{F03CD8E2-3BC8-4475-804C-0D0A5DAAC627}" type="datetimeFigureOut">
               <a:rPr lang="en-US" smtClean="0"/>
-              <a:t>3/14/2022</a:t>
+              <a:t>3/16/2022</a:t>
             </a:fld>
             <a:endParaRPr lang="en-US"/>
           </a:p>
@@ -3972,6 +3973,151 @@
 </p:sld>
 </file>
 
+<file path=ppt/slides/slide7.xml><?xml version="1.0" encoding="utf-8"?>
+<p:sld xmlns:a="http://schemas.openxmlformats.org/drawingml/2006/main" xmlns:r="http://schemas.openxmlformats.org/officeDocument/2006/relationships" xmlns:p="http://schemas.openxmlformats.org/presentationml/2006/main">
+  <p:cSld>
+    <p:spTree>
+      <p:nvGrpSpPr>
+        <p:cNvPr id="1" name=""/>
+        <p:cNvGrpSpPr/>
+        <p:nvPr/>
+      </p:nvGrpSpPr>
+      <p:grpSpPr>
+        <a:xfrm>
+          <a:off x="0" y="0"/>
+          <a:ext cx="0" cy="0"/>
+          <a:chOff x="0" y="0"/>
+          <a:chExt cx="0" cy="0"/>
+        </a:xfrm>
+      </p:grpSpPr>
+      <p:sp>
+        <p:nvSpPr>
+          <p:cNvPr id="2" name="TextBox 1">
+            <a:extLst>
+              <a:ext uri="{FF2B5EF4-FFF2-40B4-BE49-F238E27FC236}">
+                <a16:creationId xmlns:a16="http://schemas.microsoft.com/office/drawing/2014/main" id="{DAE1EFEF-3A89-45D5-BA85-37F13EA15983}"/>
+              </a:ext>
+            </a:extLst>
+          </p:cNvPr>
+          <p:cNvSpPr txBox="1"/>
+          <p:nvPr/>
+        </p:nvSpPr>
+        <p:spPr>
+          <a:xfrm>
+            <a:off x="897622" y="310393"/>
+            <a:ext cx="9940954" cy="369332"/>
+          </a:xfrm>
+          <a:prstGeom prst="rect">
+            <a:avLst/>
+          </a:prstGeom>
+          <a:noFill/>
+        </p:spPr>
+        <p:txBody>
+          <a:bodyPr wrap="square" rtlCol="0">
+            <a:spAutoFit/>
+          </a:bodyPr>
+          <a:lstStyle/>
+          <a:p>
+            <a:r>
+              <a:rPr lang="en-US" dirty="0"/>
+              <a:t>Use the green counter 1 GHz channel, and a mixed down signal for one channel of the Agilent:</a:t>
+            </a:r>
+          </a:p>
+        </p:txBody>
+      </p:sp>
+      <p:pic>
+        <p:nvPicPr>
+          <p:cNvPr id="4" name="Picture 3">
+            <a:extLst>
+              <a:ext uri="{FF2B5EF4-FFF2-40B4-BE49-F238E27FC236}">
+                <a16:creationId xmlns:a16="http://schemas.microsoft.com/office/drawing/2014/main" id="{149A0DBE-DE3D-40ED-BD40-AD43CDB3EAC5}"/>
+              </a:ext>
+            </a:extLst>
+          </p:cNvPr>
+          <p:cNvPicPr>
+            <a:picLocks noChangeAspect="1"/>
+          </p:cNvPicPr>
+          <p:nvPr/>
+        </p:nvPicPr>
+        <p:blipFill>
+          <a:blip r:embed="rId2"/>
+          <a:stretch>
+            <a:fillRect/>
+          </a:stretch>
+        </p:blipFill>
+        <p:spPr>
+          <a:xfrm>
+            <a:off x="3169914" y="1234435"/>
+            <a:ext cx="5852172" cy="4389129"/>
+          </a:xfrm>
+          <a:prstGeom prst="rect">
+            <a:avLst/>
+          </a:prstGeom>
+        </p:spPr>
+      </p:pic>
+      <p:sp>
+        <p:nvSpPr>
+          <p:cNvPr id="5" name="TextBox 4">
+            <a:extLst>
+              <a:ext uri="{FF2B5EF4-FFF2-40B4-BE49-F238E27FC236}">
+                <a16:creationId xmlns:a16="http://schemas.microsoft.com/office/drawing/2014/main" id="{44A53AB6-011B-4168-AE66-BFDFBC0C3F3B}"/>
+              </a:ext>
+            </a:extLst>
+          </p:cNvPr>
+          <p:cNvSpPr txBox="1"/>
+          <p:nvPr/>
+        </p:nvSpPr>
+        <p:spPr>
+          <a:xfrm>
+            <a:off x="352338" y="1375794"/>
+            <a:ext cx="1853967" cy="2862322"/>
+          </a:xfrm>
+          <a:prstGeom prst="rect">
+            <a:avLst/>
+          </a:prstGeom>
+          <a:noFill/>
+        </p:spPr>
+        <p:txBody>
+          <a:bodyPr wrap="square" rtlCol="0">
+            <a:spAutoFit/>
+          </a:bodyPr>
+          <a:lstStyle/>
+          <a:p>
+            <a:r>
+              <a:rPr lang="en-US" dirty="0"/>
+              <a:t>Average offset is: </a:t>
+            </a:r>
+          </a:p>
+          <a:p>
+            <a:r>
+              <a:rPr lang="en-US" dirty="0"/>
+              <a:t>8.678 Hz</a:t>
+            </a:r>
+          </a:p>
+          <a:p>
+            <a:endParaRPr lang="en-US" dirty="0"/>
+          </a:p>
+          <a:p>
+            <a:r>
+              <a:rPr lang="en-US" dirty="0"/>
+              <a:t>Agilent reading is an average of measurements taken before and after the green counter measures</a:t>
+            </a:r>
+          </a:p>
+        </p:txBody>
+      </p:sp>
+    </p:spTree>
+    <p:extLst>
+      <p:ext uri="{BB962C8B-B14F-4D97-AF65-F5344CB8AC3E}">
+        <p14:creationId xmlns:p14="http://schemas.microsoft.com/office/powerpoint/2010/main" val="2425208622"/>
+      </p:ext>
+    </p:extLst>
+  </p:cSld>
+  <p:clrMapOvr>
+    <a:masterClrMapping/>
+  </p:clrMapOvr>
+</p:sld>
+</file>
+
 <file path=ppt/theme/theme1.xml><?xml version="1.0" encoding="utf-8"?>
 <a:theme xmlns:a="http://schemas.openxmlformats.org/drawingml/2006/main" name="Office Theme">
   <a:themeElements>

</xml_diff>

<commit_message>
formatting changes and some python compatibility, there is still an issue with not being to communicate with the Agilent counter after I got the computer back from NIST
</commit_message>
<xml_diff>
--- a/counter/fa-5 counter issue.pptx
+++ b/counter/fa-5 counter issue.pptx
@@ -4070,7 +4070,7 @@
         <p:spPr>
           <a:xfrm>
             <a:off x="352338" y="1375794"/>
-            <a:ext cx="1853967" cy="2862322"/>
+            <a:ext cx="1853967" cy="2585323"/>
           </a:xfrm>
           <a:prstGeom prst="rect">
             <a:avLst/>
@@ -4100,7 +4100,7 @@
           <a:p>
             <a:r>
               <a:rPr lang="en-US" dirty="0"/>
-              <a:t>Agilent reading is an average of measurements taken before and after the green counter measures</a:t>
+              <a:t>Agilent reading is an average of measurements taken before and after the green counter reading</a:t>
             </a:r>
           </a:p>
         </p:txBody>

</xml_diff>